<commit_message>
Added dependency management to slides.
</commit_message>
<xml_diff>
--- a/docs/Architecture20170314.pptx
+++ b/docs/Architecture20170314.pptx
@@ -10437,7 +10437,7 @@
           <a:p>
             <a:fld id="{89FECE0E-94A7-4E1B-978E-B37532B19996}" type="datetimeFigureOut">
               <a:rPr lang="en-US" smtClean="0"/>
-              <a:t>3/13/2017</a:t>
+              <a:t>3/14/2017</a:t>
             </a:fld>
             <a:endParaRPr lang="en-US"/>
           </a:p>
@@ -10607,7 +10607,7 @@
           <a:p>
             <a:fld id="{89FECE0E-94A7-4E1B-978E-B37532B19996}" type="datetimeFigureOut">
               <a:rPr lang="en-US" smtClean="0"/>
-              <a:t>3/13/2017</a:t>
+              <a:t>3/14/2017</a:t>
             </a:fld>
             <a:endParaRPr lang="en-US"/>
           </a:p>
@@ -10787,7 +10787,7 @@
           <a:p>
             <a:fld id="{89FECE0E-94A7-4E1B-978E-B37532B19996}" type="datetimeFigureOut">
               <a:rPr lang="en-US" smtClean="0"/>
-              <a:t>3/13/2017</a:t>
+              <a:t>3/14/2017</a:t>
             </a:fld>
             <a:endParaRPr lang="en-US"/>
           </a:p>
@@ -10957,7 +10957,7 @@
           <a:p>
             <a:fld id="{89FECE0E-94A7-4E1B-978E-B37532B19996}" type="datetimeFigureOut">
               <a:rPr lang="en-US" smtClean="0"/>
-              <a:t>3/13/2017</a:t>
+              <a:t>3/14/2017</a:t>
             </a:fld>
             <a:endParaRPr lang="en-US"/>
           </a:p>
@@ -11203,7 +11203,7 @@
           <a:p>
             <a:fld id="{89FECE0E-94A7-4E1B-978E-B37532B19996}" type="datetimeFigureOut">
               <a:rPr lang="en-US" smtClean="0"/>
-              <a:t>3/13/2017</a:t>
+              <a:t>3/14/2017</a:t>
             </a:fld>
             <a:endParaRPr lang="en-US"/>
           </a:p>
@@ -11435,7 +11435,7 @@
           <a:p>
             <a:fld id="{89FECE0E-94A7-4E1B-978E-B37532B19996}" type="datetimeFigureOut">
               <a:rPr lang="en-US" smtClean="0"/>
-              <a:t>3/13/2017</a:t>
+              <a:t>3/14/2017</a:t>
             </a:fld>
             <a:endParaRPr lang="en-US"/>
           </a:p>
@@ -11802,7 +11802,7 @@
           <a:p>
             <a:fld id="{89FECE0E-94A7-4E1B-978E-B37532B19996}" type="datetimeFigureOut">
               <a:rPr lang="en-US" smtClean="0"/>
-              <a:t>3/13/2017</a:t>
+              <a:t>3/14/2017</a:t>
             </a:fld>
             <a:endParaRPr lang="en-US"/>
           </a:p>
@@ -11920,7 +11920,7 @@
           <a:p>
             <a:fld id="{89FECE0E-94A7-4E1B-978E-B37532B19996}" type="datetimeFigureOut">
               <a:rPr lang="en-US" smtClean="0"/>
-              <a:t>3/13/2017</a:t>
+              <a:t>3/14/2017</a:t>
             </a:fld>
             <a:endParaRPr lang="en-US"/>
           </a:p>
@@ -12015,7 +12015,7 @@
           <a:p>
             <a:fld id="{89FECE0E-94A7-4E1B-978E-B37532B19996}" type="datetimeFigureOut">
               <a:rPr lang="en-US" smtClean="0"/>
-              <a:t>3/13/2017</a:t>
+              <a:t>3/14/2017</a:t>
             </a:fld>
             <a:endParaRPr lang="en-US"/>
           </a:p>
@@ -12292,7 +12292,7 @@
           <a:p>
             <a:fld id="{89FECE0E-94A7-4E1B-978E-B37532B19996}" type="datetimeFigureOut">
               <a:rPr lang="en-US" smtClean="0"/>
-              <a:t>3/13/2017</a:t>
+              <a:t>3/14/2017</a:t>
             </a:fld>
             <a:endParaRPr lang="en-US"/>
           </a:p>
@@ -12545,7 +12545,7 @@
           <a:p>
             <a:fld id="{89FECE0E-94A7-4E1B-978E-B37532B19996}" type="datetimeFigureOut">
               <a:rPr lang="en-US" smtClean="0"/>
-              <a:t>3/13/2017</a:t>
+              <a:t>3/14/2017</a:t>
             </a:fld>
             <a:endParaRPr lang="en-US"/>
           </a:p>
@@ -12758,7 +12758,7 @@
           <a:p>
             <a:fld id="{89FECE0E-94A7-4E1B-978E-B37532B19996}" type="datetimeFigureOut">
               <a:rPr lang="en-US" smtClean="0"/>
-              <a:t>3/13/2017</a:t>
+              <a:t>3/14/2017</a:t>
             </a:fld>
             <a:endParaRPr lang="en-US"/>
           </a:p>
@@ -16656,6 +16656,50 @@
           </a:p>
         </p:txBody>
       </p:sp>
+      <p:sp>
+        <p:nvSpPr>
+          <p:cNvPr id="2" name="Rectangle 1"/>
+          <p:cNvSpPr/>
+          <p:nvPr/>
+        </p:nvSpPr>
+        <p:spPr>
+          <a:xfrm>
+            <a:off x="2957803" y="6136565"/>
+            <a:ext cx="3554963" cy="397419"/>
+          </a:xfrm>
+          <a:prstGeom prst="rect">
+            <a:avLst/>
+          </a:prstGeom>
+        </p:spPr>
+        <p:style>
+          <a:lnRef idx="2">
+            <a:schemeClr val="accent2">
+              <a:shade val="50000"/>
+            </a:schemeClr>
+          </a:lnRef>
+          <a:fillRef idx="1">
+            <a:schemeClr val="accent2"/>
+          </a:fillRef>
+          <a:effectRef idx="0">
+            <a:schemeClr val="accent2"/>
+          </a:effectRef>
+          <a:fontRef idx="minor">
+            <a:schemeClr val="lt1"/>
+          </a:fontRef>
+        </p:style>
+        <p:txBody>
+          <a:bodyPr rtlCol="0" anchor="ctr"/>
+          <a:lstStyle/>
+          <a:p>
+            <a:pPr algn="ctr"/>
+            <a:r>
+              <a:rPr lang="en-US" dirty="0" smtClean="0"/>
+              <a:t>Dependency Management</a:t>
+            </a:r>
+            <a:endParaRPr lang="en-US" dirty="0"/>
+          </a:p>
+        </p:txBody>
+      </p:sp>
     </p:spTree>
     <p:extLst>
       <p:ext uri="{BB962C8B-B14F-4D97-AF65-F5344CB8AC3E}">

</xml_diff>